<commit_message>
Add driver installer and move parameters
Move definition of Account SID, Flow ID and Sending/From phone number from the Redirector to the driver
</commit_message>
<xml_diff>
--- a/NotifyDemo Description.pptx
+++ b/NotifyDemo Description.pptx
@@ -281,7 +281,7 @@
           <a:p>
             <a:fld id="{79084D12-9971-4D85-90B6-EA2E8E4DAC18}" type="datetimeFigureOut">
               <a:rPr lang="en-GB" smtClean="0"/>
-              <a:t>30/01/2020</a:t>
+              <a:t>12/05/2020</a:t>
             </a:fld>
             <a:endParaRPr lang="en-GB"/>
           </a:p>
@@ -481,7 +481,7 @@
           <a:p>
             <a:fld id="{79084D12-9971-4D85-90B6-EA2E8E4DAC18}" type="datetimeFigureOut">
               <a:rPr lang="en-GB" smtClean="0"/>
-              <a:t>30/01/2020</a:t>
+              <a:t>12/05/2020</a:t>
             </a:fld>
             <a:endParaRPr lang="en-GB"/>
           </a:p>
@@ -691,7 +691,7 @@
           <a:p>
             <a:fld id="{79084D12-9971-4D85-90B6-EA2E8E4DAC18}" type="datetimeFigureOut">
               <a:rPr lang="en-GB" smtClean="0"/>
-              <a:t>30/01/2020</a:t>
+              <a:t>12/05/2020</a:t>
             </a:fld>
             <a:endParaRPr lang="en-GB"/>
           </a:p>
@@ -891,7 +891,7 @@
           <a:p>
             <a:fld id="{79084D12-9971-4D85-90B6-EA2E8E4DAC18}" type="datetimeFigureOut">
               <a:rPr lang="en-GB" smtClean="0"/>
-              <a:t>30/01/2020</a:t>
+              <a:t>12/05/2020</a:t>
             </a:fld>
             <a:endParaRPr lang="en-GB"/>
           </a:p>
@@ -1167,7 +1167,7 @@
           <a:p>
             <a:fld id="{79084D12-9971-4D85-90B6-EA2E8E4DAC18}" type="datetimeFigureOut">
               <a:rPr lang="en-GB" smtClean="0"/>
-              <a:t>30/01/2020</a:t>
+              <a:t>12/05/2020</a:t>
             </a:fld>
             <a:endParaRPr lang="en-GB"/>
           </a:p>
@@ -1435,7 +1435,7 @@
           <a:p>
             <a:fld id="{79084D12-9971-4D85-90B6-EA2E8E4DAC18}" type="datetimeFigureOut">
               <a:rPr lang="en-GB" smtClean="0"/>
-              <a:t>30/01/2020</a:t>
+              <a:t>12/05/2020</a:t>
             </a:fld>
             <a:endParaRPr lang="en-GB"/>
           </a:p>
@@ -1850,7 +1850,7 @@
           <a:p>
             <a:fld id="{79084D12-9971-4D85-90B6-EA2E8E4DAC18}" type="datetimeFigureOut">
               <a:rPr lang="en-GB" smtClean="0"/>
-              <a:t>30/01/2020</a:t>
+              <a:t>12/05/2020</a:t>
             </a:fld>
             <a:endParaRPr lang="en-GB"/>
           </a:p>
@@ -1992,7 +1992,7 @@
           <a:p>
             <a:fld id="{79084D12-9971-4D85-90B6-EA2E8E4DAC18}" type="datetimeFigureOut">
               <a:rPr lang="en-GB" smtClean="0"/>
-              <a:t>30/01/2020</a:t>
+              <a:t>12/05/2020</a:t>
             </a:fld>
             <a:endParaRPr lang="en-GB"/>
           </a:p>
@@ -2105,7 +2105,7 @@
           <a:p>
             <a:fld id="{79084D12-9971-4D85-90B6-EA2E8E4DAC18}" type="datetimeFigureOut">
               <a:rPr lang="en-GB" smtClean="0"/>
-              <a:t>30/01/2020</a:t>
+              <a:t>12/05/2020</a:t>
             </a:fld>
             <a:endParaRPr lang="en-GB"/>
           </a:p>
@@ -2418,7 +2418,7 @@
           <a:p>
             <a:fld id="{79084D12-9971-4D85-90B6-EA2E8E4DAC18}" type="datetimeFigureOut">
               <a:rPr lang="en-GB" smtClean="0"/>
-              <a:t>30/01/2020</a:t>
+              <a:t>12/05/2020</a:t>
             </a:fld>
             <a:endParaRPr lang="en-GB"/>
           </a:p>
@@ -2707,7 +2707,7 @@
           <a:p>
             <a:fld id="{79084D12-9971-4D85-90B6-EA2E8E4DAC18}" type="datetimeFigureOut">
               <a:rPr lang="en-GB" smtClean="0"/>
-              <a:t>30/01/2020</a:t>
+              <a:t>12/05/2020</a:t>
             </a:fld>
             <a:endParaRPr lang="en-GB"/>
           </a:p>
@@ -2950,7 +2950,7 @@
           <a:p>
             <a:fld id="{79084D12-9971-4D85-90B6-EA2E8E4DAC18}" type="datetimeFigureOut">
               <a:rPr lang="en-GB" smtClean="0"/>
-              <a:t>30/01/2020</a:t>
+              <a:t>12/05/2020</a:t>
             </a:fld>
             <a:endParaRPr lang="en-GB"/>
           </a:p>
@@ -4239,6 +4239,57 @@
           </a:p>
         </p:txBody>
       </p:sp>
+      <p:sp>
+        <p:nvSpPr>
+          <p:cNvPr id="3" name="Speech Bubble: Rectangle 2">
+            <a:extLst>
+              <a:ext uri="{FF2B5EF4-FFF2-40B4-BE49-F238E27FC236}">
+                <a16:creationId xmlns:a16="http://schemas.microsoft.com/office/drawing/2014/main" id="{F5A3BAA9-6848-4B63-9FDB-94BC538DCDED}"/>
+              </a:ext>
+            </a:extLst>
+          </p:cNvPr>
+          <p:cNvSpPr/>
+          <p:nvPr/>
+        </p:nvSpPr>
+        <p:spPr>
+          <a:xfrm>
+            <a:off x="8031673" y="51410"/>
+            <a:ext cx="4070071" cy="1202418"/>
+          </a:xfrm>
+          <a:prstGeom prst="wedgeRectCallout">
+            <a:avLst>
+              <a:gd name="adj1" fmla="val -54185"/>
+              <a:gd name="adj2" fmla="val 22517"/>
+            </a:avLst>
+          </a:prstGeom>
+        </p:spPr>
+        <p:style>
+          <a:lnRef idx="2">
+            <a:schemeClr val="accent1">
+              <a:shade val="50000"/>
+            </a:schemeClr>
+          </a:lnRef>
+          <a:fillRef idx="1">
+            <a:schemeClr val="accent1"/>
+          </a:fillRef>
+          <a:effectRef idx="0">
+            <a:schemeClr val="accent1"/>
+          </a:effectRef>
+          <a:fontRef idx="minor">
+            <a:schemeClr val="lt1"/>
+          </a:fontRef>
+        </p:style>
+        <p:txBody>
+          <a:bodyPr rtlCol="0" anchor="ctr"/>
+          <a:lstStyle/>
+          <a:p>
+            <a:r>
+              <a:rPr lang="en-GB" sz="1400" dirty="0"/>
+              <a:t>A full flow has been produced for this. See the JSON representation of the flow within the repo – file ‘DemoTwilioFlowV1.json’ You can paste this into Twilio.</a:t>
+            </a:r>
+          </a:p>
+        </p:txBody>
+      </p:sp>
     </p:spTree>
     <p:extLst>
       <p:ext uri="{BB962C8B-B14F-4D97-AF65-F5344CB8AC3E}">
@@ -5085,7 +5136,35 @@
             </a:pPr>
             <a:r>
               <a:rPr lang="en-GB" dirty="0"/>
-              <a:t>Build and install the driver – import the registry file from the code sample to make Geo SCADA run the driver.</a:t>
+              <a:t>Modify and build the driver</a:t>
+            </a:r>
+          </a:p>
+          <a:p>
+            <a:pPr marL="971550" lvl="1" indent="-514350">
+              <a:buFont typeface="+mj-lt"/>
+              <a:buAutoNum type="arabicPeriod"/>
+            </a:pPr>
+            <a:r>
+              <a:rPr lang="en-GB" dirty="0"/>
+              <a:t>Build and copy the driver .exe and .</a:t>
+            </a:r>
+            <a:r>
+              <a:rPr lang="en-GB" dirty="0" err="1"/>
+              <a:t>dll</a:t>
+            </a:r>
+            <a:r>
+              <a:rPr lang="en-GB" dirty="0"/>
+              <a:t> to the Geo SCADA server</a:t>
+            </a:r>
+          </a:p>
+          <a:p>
+            <a:pPr marL="971550" lvl="1" indent="-514350">
+              <a:buFont typeface="+mj-lt"/>
+              <a:buAutoNum type="arabicPeriod"/>
+            </a:pPr>
+            <a:r>
+              <a:rPr lang="en-GB" dirty="0"/>
+              <a:t>import the registry file from the code sample to make Geo SCADA run the driver.</a:t>
             </a:r>
           </a:p>
           <a:p>
@@ -5095,7 +5174,35 @@
             </a:pPr>
             <a:r>
               <a:rPr lang="en-GB" dirty="0"/>
-              <a:t>Modify, build and deploy the redirector – set up/change for https, port numbers, firewall restrictions etc.</a:t>
+              <a:t>Modify and build the redirector </a:t>
+            </a:r>
+          </a:p>
+          <a:p>
+            <a:pPr marL="971550" lvl="1" indent="-514350">
+              <a:buFont typeface="+mj-lt"/>
+              <a:buAutoNum type="arabicPeriod"/>
+            </a:pPr>
+            <a:r>
+              <a:rPr lang="en-GB" dirty="0"/>
+              <a:t>Build the installer for the redirector, copy the .</a:t>
+            </a:r>
+            <a:r>
+              <a:rPr lang="en-GB" dirty="0" err="1"/>
+              <a:t>msi</a:t>
+            </a:r>
+            <a:r>
+              <a:rPr lang="en-GB" dirty="0"/>
+              <a:t> to the target and run it</a:t>
+            </a:r>
+          </a:p>
+          <a:p>
+            <a:pPr marL="971550" lvl="1" indent="-514350">
+              <a:buFont typeface="+mj-lt"/>
+              <a:buAutoNum type="arabicPeriod"/>
+            </a:pPr>
+            <a:r>
+              <a:rPr lang="en-GB" dirty="0"/>
+              <a:t>Set up/change .config for https, port numbers, firewall restrictions etc.</a:t>
             </a:r>
           </a:p>
           <a:p>

</xml_diff>

<commit_message>
Set to Release, fix Flow Id field
Set field name in correct place.
</commit_message>
<xml_diff>
--- a/NotifyDemo Description.pptx
+++ b/NotifyDemo Description.pptx
@@ -281,7 +281,7 @@
           <a:p>
             <a:fld id="{79084D12-9971-4D85-90B6-EA2E8E4DAC18}" type="datetimeFigureOut">
               <a:rPr lang="en-GB" smtClean="0"/>
-              <a:t>12/05/2020</a:t>
+              <a:t>27/07/2020</a:t>
             </a:fld>
             <a:endParaRPr lang="en-GB"/>
           </a:p>
@@ -481,7 +481,7 @@
           <a:p>
             <a:fld id="{79084D12-9971-4D85-90B6-EA2E8E4DAC18}" type="datetimeFigureOut">
               <a:rPr lang="en-GB" smtClean="0"/>
-              <a:t>12/05/2020</a:t>
+              <a:t>27/07/2020</a:t>
             </a:fld>
             <a:endParaRPr lang="en-GB"/>
           </a:p>
@@ -691,7 +691,7 @@
           <a:p>
             <a:fld id="{79084D12-9971-4D85-90B6-EA2E8E4DAC18}" type="datetimeFigureOut">
               <a:rPr lang="en-GB" smtClean="0"/>
-              <a:t>12/05/2020</a:t>
+              <a:t>27/07/2020</a:t>
             </a:fld>
             <a:endParaRPr lang="en-GB"/>
           </a:p>
@@ -891,7 +891,7 @@
           <a:p>
             <a:fld id="{79084D12-9971-4D85-90B6-EA2E8E4DAC18}" type="datetimeFigureOut">
               <a:rPr lang="en-GB" smtClean="0"/>
-              <a:t>12/05/2020</a:t>
+              <a:t>27/07/2020</a:t>
             </a:fld>
             <a:endParaRPr lang="en-GB"/>
           </a:p>
@@ -1167,7 +1167,7 @@
           <a:p>
             <a:fld id="{79084D12-9971-4D85-90B6-EA2E8E4DAC18}" type="datetimeFigureOut">
               <a:rPr lang="en-GB" smtClean="0"/>
-              <a:t>12/05/2020</a:t>
+              <a:t>27/07/2020</a:t>
             </a:fld>
             <a:endParaRPr lang="en-GB"/>
           </a:p>
@@ -1435,7 +1435,7 @@
           <a:p>
             <a:fld id="{79084D12-9971-4D85-90B6-EA2E8E4DAC18}" type="datetimeFigureOut">
               <a:rPr lang="en-GB" smtClean="0"/>
-              <a:t>12/05/2020</a:t>
+              <a:t>27/07/2020</a:t>
             </a:fld>
             <a:endParaRPr lang="en-GB"/>
           </a:p>
@@ -1850,7 +1850,7 @@
           <a:p>
             <a:fld id="{79084D12-9971-4D85-90B6-EA2E8E4DAC18}" type="datetimeFigureOut">
               <a:rPr lang="en-GB" smtClean="0"/>
-              <a:t>12/05/2020</a:t>
+              <a:t>27/07/2020</a:t>
             </a:fld>
             <a:endParaRPr lang="en-GB"/>
           </a:p>
@@ -1992,7 +1992,7 @@
           <a:p>
             <a:fld id="{79084D12-9971-4D85-90B6-EA2E8E4DAC18}" type="datetimeFigureOut">
               <a:rPr lang="en-GB" smtClean="0"/>
-              <a:t>12/05/2020</a:t>
+              <a:t>27/07/2020</a:t>
             </a:fld>
             <a:endParaRPr lang="en-GB"/>
           </a:p>
@@ -2105,7 +2105,7 @@
           <a:p>
             <a:fld id="{79084D12-9971-4D85-90B6-EA2E8E4DAC18}" type="datetimeFigureOut">
               <a:rPr lang="en-GB" smtClean="0"/>
-              <a:t>12/05/2020</a:t>
+              <a:t>27/07/2020</a:t>
             </a:fld>
             <a:endParaRPr lang="en-GB"/>
           </a:p>
@@ -2418,7 +2418,7 @@
           <a:p>
             <a:fld id="{79084D12-9971-4D85-90B6-EA2E8E4DAC18}" type="datetimeFigureOut">
               <a:rPr lang="en-GB" smtClean="0"/>
-              <a:t>12/05/2020</a:t>
+              <a:t>27/07/2020</a:t>
             </a:fld>
             <a:endParaRPr lang="en-GB"/>
           </a:p>
@@ -2707,7 +2707,7 @@
           <a:p>
             <a:fld id="{79084D12-9971-4D85-90B6-EA2E8E4DAC18}" type="datetimeFigureOut">
               <a:rPr lang="en-GB" smtClean="0"/>
-              <a:t>12/05/2020</a:t>
+              <a:t>27/07/2020</a:t>
             </a:fld>
             <a:endParaRPr lang="en-GB"/>
           </a:p>
@@ -2950,7 +2950,7 @@
           <a:p>
             <a:fld id="{79084D12-9971-4D85-90B6-EA2E8E4DAC18}" type="datetimeFigureOut">
               <a:rPr lang="en-GB" smtClean="0"/>
-              <a:t>12/05/2020</a:t>
+              <a:t>27/07/2020</a:t>
             </a:fld>
             <a:endParaRPr lang="en-GB"/>
           </a:p>
@@ -4870,103 +4870,12 @@
           <a:chExt cx="0" cy="0"/>
         </a:xfrm>
       </p:grpSpPr>
-      <p:sp>
-        <p:nvSpPr>
-          <p:cNvPr id="2" name="Title 1">
-            <a:extLst>
-              <a:ext uri="{FF2B5EF4-FFF2-40B4-BE49-F238E27FC236}">
-                <a16:creationId xmlns:a16="http://schemas.microsoft.com/office/drawing/2014/main" id="{BB175C6A-0251-4C90-9DDE-E28BED03BC4F}"/>
-              </a:ext>
-            </a:extLst>
-          </p:cNvPr>
-          <p:cNvSpPr>
-            <a:spLocks noGrp="1"/>
-          </p:cNvSpPr>
-          <p:nvPr>
-            <p:ph type="title"/>
-          </p:nvPr>
-        </p:nvSpPr>
-        <p:spPr/>
-        <p:txBody>
-          <a:bodyPr/>
-          <a:lstStyle/>
-          <a:p>
-            <a:r>
-              <a:rPr lang="en-GB" dirty="0"/>
-              <a:t>Twilio – Save and Publish</a:t>
-            </a:r>
-          </a:p>
-        </p:txBody>
-      </p:sp>
-      <p:sp>
-        <p:nvSpPr>
-          <p:cNvPr id="3" name="Content Placeholder 2">
-            <a:extLst>
-              <a:ext uri="{FF2B5EF4-FFF2-40B4-BE49-F238E27FC236}">
-                <a16:creationId xmlns:a16="http://schemas.microsoft.com/office/drawing/2014/main" id="{09FEE35C-0400-4D75-A8CE-57446A54D639}"/>
-              </a:ext>
-            </a:extLst>
-          </p:cNvPr>
-          <p:cNvSpPr>
-            <a:spLocks noGrp="1"/>
-          </p:cNvSpPr>
-          <p:nvPr>
-            <p:ph idx="1"/>
-          </p:nvPr>
-        </p:nvSpPr>
-        <p:spPr>
-          <a:xfrm>
-            <a:off x="838200" y="1825625"/>
-            <a:ext cx="6262396" cy="4351338"/>
-          </a:xfrm>
-        </p:spPr>
-        <p:txBody>
-          <a:bodyPr>
-            <a:normAutofit lnSpcReduction="10000"/>
-          </a:bodyPr>
-          <a:lstStyle/>
-          <a:p>
-            <a:r>
-              <a:rPr lang="en-GB" dirty="0"/>
-              <a:t>Click to save any flows: </a:t>
-            </a:r>
-          </a:p>
-          <a:p>
-            <a:endParaRPr lang="en-GB" dirty="0"/>
-          </a:p>
-          <a:p>
-            <a:r>
-              <a:rPr lang="en-GB" dirty="0"/>
-              <a:t>Click to publish and make ‘live’: </a:t>
-            </a:r>
-          </a:p>
-          <a:p>
-            <a:endParaRPr lang="en-GB" dirty="0"/>
-          </a:p>
-          <a:p>
-            <a:r>
-              <a:rPr lang="en-GB" dirty="0"/>
-              <a:t>On the Studio Dashboard copy the ‘SID’ (a long string) into the Redirector code.</a:t>
-            </a:r>
-          </a:p>
-          <a:p>
-            <a:endParaRPr lang="en-GB" dirty="0"/>
-          </a:p>
-          <a:p>
-            <a:pPr lvl="1"/>
-            <a:r>
-              <a:rPr lang="en-GB" dirty="0"/>
-              <a:t>Also your Account SID and Outgoing number (formatted as E.164, e.g. +1xxxxxxxxxx)</a:t>
-            </a:r>
-          </a:p>
-        </p:txBody>
-      </p:sp>
       <p:pic>
         <p:nvPicPr>
-          <p:cNvPr id="4" name="Picture 3">
-            <a:extLst>
-              <a:ext uri="{FF2B5EF4-FFF2-40B4-BE49-F238E27FC236}">
-                <a16:creationId xmlns:a16="http://schemas.microsoft.com/office/drawing/2014/main" id="{7AA0952D-CC79-4C01-BFA0-A105EC5B9F76}"/>
+          <p:cNvPr id="7" name="Picture 6">
+            <a:extLst>
+              <a:ext uri="{FF2B5EF4-FFF2-40B4-BE49-F238E27FC236}">
+                <a16:creationId xmlns:a16="http://schemas.microsoft.com/office/drawing/2014/main" id="{2CE661AF-4A33-4998-9459-2A99C0726B72}"/>
               </a:ext>
             </a:extLst>
           </p:cNvPr>
@@ -4983,20 +4892,115 @@
         </p:blipFill>
         <p:spPr>
           <a:xfrm>
-            <a:off x="4769304" y="1690688"/>
-            <a:ext cx="3829050" cy="904875"/>
+            <a:off x="7780232" y="3429000"/>
+            <a:ext cx="4054191" cy="3261643"/>
           </a:xfrm>
           <a:prstGeom prst="rect">
             <a:avLst/>
           </a:prstGeom>
         </p:spPr>
       </p:pic>
+      <p:sp>
+        <p:nvSpPr>
+          <p:cNvPr id="2" name="Title 1">
+            <a:extLst>
+              <a:ext uri="{FF2B5EF4-FFF2-40B4-BE49-F238E27FC236}">
+                <a16:creationId xmlns:a16="http://schemas.microsoft.com/office/drawing/2014/main" id="{BB175C6A-0251-4C90-9DDE-E28BED03BC4F}"/>
+              </a:ext>
+            </a:extLst>
+          </p:cNvPr>
+          <p:cNvSpPr>
+            <a:spLocks noGrp="1"/>
+          </p:cNvSpPr>
+          <p:nvPr>
+            <p:ph type="title"/>
+          </p:nvPr>
+        </p:nvSpPr>
+        <p:spPr/>
+        <p:txBody>
+          <a:bodyPr/>
+          <a:lstStyle/>
+          <a:p>
+            <a:r>
+              <a:rPr lang="en-GB" dirty="0"/>
+              <a:t>Twilio – Save and Publish</a:t>
+            </a:r>
+          </a:p>
+        </p:txBody>
+      </p:sp>
+      <p:sp>
+        <p:nvSpPr>
+          <p:cNvPr id="3" name="Content Placeholder 2">
+            <a:extLst>
+              <a:ext uri="{FF2B5EF4-FFF2-40B4-BE49-F238E27FC236}">
+                <a16:creationId xmlns:a16="http://schemas.microsoft.com/office/drawing/2014/main" id="{09FEE35C-0400-4D75-A8CE-57446A54D639}"/>
+              </a:ext>
+            </a:extLst>
+          </p:cNvPr>
+          <p:cNvSpPr>
+            <a:spLocks noGrp="1"/>
+          </p:cNvSpPr>
+          <p:nvPr>
+            <p:ph idx="1"/>
+          </p:nvPr>
+        </p:nvSpPr>
+        <p:spPr>
+          <a:xfrm>
+            <a:off x="838200" y="1825625"/>
+            <a:ext cx="6262396" cy="4351338"/>
+          </a:xfrm>
+        </p:spPr>
+        <p:txBody>
+          <a:bodyPr>
+            <a:normAutofit lnSpcReduction="10000"/>
+          </a:bodyPr>
+          <a:lstStyle/>
+          <a:p>
+            <a:r>
+              <a:rPr lang="en-GB" dirty="0"/>
+              <a:t>Click to save any flows: </a:t>
+            </a:r>
+          </a:p>
+          <a:p>
+            <a:endParaRPr lang="en-GB" dirty="0"/>
+          </a:p>
+          <a:p>
+            <a:r>
+              <a:rPr lang="en-GB" dirty="0"/>
+              <a:t>Click to publish and make ‘live’: </a:t>
+            </a:r>
+          </a:p>
+          <a:p>
+            <a:endParaRPr lang="en-GB" dirty="0"/>
+          </a:p>
+          <a:p>
+            <a:r>
+              <a:rPr lang="en-GB" dirty="0"/>
+              <a:t>On the Studio Dashboard copy the ‘SID’ (a long string) into the database object of the Redirector</a:t>
+            </a:r>
+          </a:p>
+          <a:p>
+            <a:pPr lvl="1"/>
+            <a:r>
+              <a:rPr lang="en-GB" dirty="0"/>
+              <a:t>Also your Account SID and Outgoing number (formatted as E.164 phone number format, e.g. +1xxxxxxxxxx)</a:t>
+            </a:r>
+            <a:br>
+              <a:rPr lang="en-GB" dirty="0"/>
+            </a:br>
+            <a:r>
+              <a:rPr lang="en-GB" dirty="0"/>
+              <a:t>and Flow ID</a:t>
+            </a:r>
+          </a:p>
+        </p:txBody>
+      </p:sp>
       <p:pic>
         <p:nvPicPr>
-          <p:cNvPr id="5" name="Picture 4">
-            <a:extLst>
-              <a:ext uri="{FF2B5EF4-FFF2-40B4-BE49-F238E27FC236}">
-                <a16:creationId xmlns:a16="http://schemas.microsoft.com/office/drawing/2014/main" id="{7D39B2B7-357E-4805-B41D-80CB5B4A4AB3}"/>
+          <p:cNvPr id="4" name="Picture 3">
+            <a:extLst>
+              <a:ext uri="{FF2B5EF4-FFF2-40B4-BE49-F238E27FC236}">
+                <a16:creationId xmlns:a16="http://schemas.microsoft.com/office/drawing/2014/main" id="{7AA0952D-CC79-4C01-BFA0-A105EC5B9F76}"/>
               </a:ext>
             </a:extLst>
           </p:cNvPr>
@@ -5013,8 +5017,8 @@
         </p:blipFill>
         <p:spPr>
           <a:xfrm>
-            <a:off x="5879452" y="2776538"/>
-            <a:ext cx="2019300" cy="704850"/>
+            <a:off x="4769304" y="1690688"/>
+            <a:ext cx="3829050" cy="904875"/>
           </a:xfrm>
           <a:prstGeom prst="rect">
             <a:avLst/>
@@ -5023,10 +5027,10 @@
       </p:pic>
       <p:pic>
         <p:nvPicPr>
-          <p:cNvPr id="7" name="Picture 6">
-            <a:extLst>
-              <a:ext uri="{FF2B5EF4-FFF2-40B4-BE49-F238E27FC236}">
-                <a16:creationId xmlns:a16="http://schemas.microsoft.com/office/drawing/2014/main" id="{0C689703-6D1F-4735-9EE9-43D8973C5DF9}"/>
+          <p:cNvPr id="5" name="Picture 4">
+            <a:extLst>
+              <a:ext uri="{FF2B5EF4-FFF2-40B4-BE49-F238E27FC236}">
+                <a16:creationId xmlns:a16="http://schemas.microsoft.com/office/drawing/2014/main" id="{7D39B2B7-357E-4805-B41D-80CB5B4A4AB3}"/>
               </a:ext>
             </a:extLst>
           </p:cNvPr>
@@ -5043,14 +5047,176 @@
         </p:blipFill>
         <p:spPr>
           <a:xfrm>
-            <a:off x="7898752" y="3301222"/>
-            <a:ext cx="3577415" cy="3438882"/>
+            <a:off x="5879452" y="2776538"/>
+            <a:ext cx="2019300" cy="704850"/>
           </a:xfrm>
           <a:prstGeom prst="rect">
             <a:avLst/>
           </a:prstGeom>
         </p:spPr>
       </p:pic>
+      <p:cxnSp>
+        <p:nvCxnSpPr>
+          <p:cNvPr id="9" name="Straight Arrow Connector 8">
+            <a:extLst>
+              <a:ext uri="{FF2B5EF4-FFF2-40B4-BE49-F238E27FC236}">
+                <a16:creationId xmlns:a16="http://schemas.microsoft.com/office/drawing/2014/main" id="{CEC6DCC9-D8D3-4DEA-878D-EBA683051009}"/>
+              </a:ext>
+            </a:extLst>
+          </p:cNvPr>
+          <p:cNvCxnSpPr>
+            <a:cxnSpLocks/>
+          </p:cNvCxnSpPr>
+          <p:nvPr/>
+        </p:nvCxnSpPr>
+        <p:spPr>
+          <a:xfrm>
+            <a:off x="6038422" y="5653736"/>
+            <a:ext cx="2191178" cy="633942"/>
+          </a:xfrm>
+          <a:prstGeom prst="straightConnector1">
+            <a:avLst/>
+          </a:prstGeom>
+          <a:ln>
+            <a:tailEnd type="triangle"/>
+          </a:ln>
+        </p:spPr>
+        <p:style>
+          <a:lnRef idx="1">
+            <a:schemeClr val="accent1"/>
+          </a:lnRef>
+          <a:fillRef idx="0">
+            <a:schemeClr val="accent1"/>
+          </a:fillRef>
+          <a:effectRef idx="0">
+            <a:schemeClr val="accent1"/>
+          </a:effectRef>
+          <a:fontRef idx="minor">
+            <a:schemeClr val="tx1"/>
+          </a:fontRef>
+        </p:style>
+      </p:cxnSp>
+      <p:cxnSp>
+        <p:nvCxnSpPr>
+          <p:cNvPr id="11" name="Straight Arrow Connector 10">
+            <a:extLst>
+              <a:ext uri="{FF2B5EF4-FFF2-40B4-BE49-F238E27FC236}">
+                <a16:creationId xmlns:a16="http://schemas.microsoft.com/office/drawing/2014/main" id="{AB8A3BA0-2FA1-4064-8E29-5ECD6355FC3C}"/>
+              </a:ext>
+            </a:extLst>
+          </p:cNvPr>
+          <p:cNvCxnSpPr>
+            <a:cxnSpLocks/>
+          </p:cNvCxnSpPr>
+          <p:nvPr/>
+        </p:nvCxnSpPr>
+        <p:spPr>
+          <a:xfrm>
+            <a:off x="4374037" y="4871673"/>
+            <a:ext cx="3912124" cy="690141"/>
+          </a:xfrm>
+          <a:prstGeom prst="straightConnector1">
+            <a:avLst/>
+          </a:prstGeom>
+          <a:ln>
+            <a:tailEnd type="triangle"/>
+          </a:ln>
+        </p:spPr>
+        <p:style>
+          <a:lnRef idx="1">
+            <a:schemeClr val="accent1"/>
+          </a:lnRef>
+          <a:fillRef idx="0">
+            <a:schemeClr val="accent1"/>
+          </a:fillRef>
+          <a:effectRef idx="0">
+            <a:schemeClr val="accent1"/>
+          </a:effectRef>
+          <a:fontRef idx="minor">
+            <a:schemeClr val="tx1"/>
+          </a:fontRef>
+        </p:style>
+      </p:cxnSp>
+      <p:cxnSp>
+        <p:nvCxnSpPr>
+          <p:cNvPr id="13" name="Straight Arrow Connector 12">
+            <a:extLst>
+              <a:ext uri="{FF2B5EF4-FFF2-40B4-BE49-F238E27FC236}">
+                <a16:creationId xmlns:a16="http://schemas.microsoft.com/office/drawing/2014/main" id="{577F8B83-F4D5-4FD0-9563-D39D96927DF7}"/>
+              </a:ext>
+            </a:extLst>
+          </p:cNvPr>
+          <p:cNvCxnSpPr>
+            <a:cxnSpLocks/>
+          </p:cNvCxnSpPr>
+          <p:nvPr/>
+        </p:nvCxnSpPr>
+        <p:spPr>
+          <a:xfrm>
+            <a:off x="6330099" y="5480800"/>
+            <a:ext cx="2135171" cy="339164"/>
+          </a:xfrm>
+          <a:prstGeom prst="straightConnector1">
+            <a:avLst/>
+          </a:prstGeom>
+          <a:ln>
+            <a:tailEnd type="triangle"/>
+          </a:ln>
+        </p:spPr>
+        <p:style>
+          <a:lnRef idx="1">
+            <a:schemeClr val="accent1"/>
+          </a:lnRef>
+          <a:fillRef idx="0">
+            <a:schemeClr val="accent1"/>
+          </a:fillRef>
+          <a:effectRef idx="0">
+            <a:schemeClr val="accent1"/>
+          </a:effectRef>
+          <a:fontRef idx="minor">
+            <a:schemeClr val="tx1"/>
+          </a:fontRef>
+        </p:style>
+      </p:cxnSp>
+      <p:cxnSp>
+        <p:nvCxnSpPr>
+          <p:cNvPr id="15" name="Straight Arrow Connector 14">
+            <a:extLst>
+              <a:ext uri="{FF2B5EF4-FFF2-40B4-BE49-F238E27FC236}">
+                <a16:creationId xmlns:a16="http://schemas.microsoft.com/office/drawing/2014/main" id="{A224DC70-C37E-4B18-904B-89C7D0EC4188}"/>
+              </a:ext>
+            </a:extLst>
+          </p:cNvPr>
+          <p:cNvCxnSpPr/>
+          <p:nvPr/>
+        </p:nvCxnSpPr>
+        <p:spPr>
+          <a:xfrm>
+            <a:off x="3478491" y="5911886"/>
+            <a:ext cx="5119863" cy="110715"/>
+          </a:xfrm>
+          <a:prstGeom prst="straightConnector1">
+            <a:avLst/>
+          </a:prstGeom>
+          <a:ln>
+            <a:tailEnd type="triangle"/>
+          </a:ln>
+        </p:spPr>
+        <p:style>
+          <a:lnRef idx="1">
+            <a:schemeClr val="accent1"/>
+          </a:lnRef>
+          <a:fillRef idx="0">
+            <a:schemeClr val="accent1"/>
+          </a:fillRef>
+          <a:effectRef idx="0">
+            <a:schemeClr val="accent1"/>
+          </a:effectRef>
+          <a:fontRef idx="minor">
+            <a:schemeClr val="tx1"/>
+          </a:fontRef>
+        </p:style>
+      </p:cxnSp>
     </p:spTree>
     <p:extLst>
       <p:ext uri="{BB962C8B-B14F-4D97-AF65-F5344CB8AC3E}">
@@ -5881,7 +6047,7 @@
         <p:spPr/>
         <p:txBody>
           <a:bodyPr>
-            <a:normAutofit fontScale="85000" lnSpcReduction="20000"/>
+            <a:normAutofit fontScale="77500" lnSpcReduction="20000"/>
           </a:bodyPr>
           <a:lstStyle/>
           <a:p>
@@ -5897,6 +6063,13 @@
             </a:r>
           </a:p>
           <a:p>
+            <a:pPr lvl="1"/>
+            <a:r>
+              <a:rPr lang="en-GB" dirty="0"/>
+              <a:t>Other services could be easily added</a:t>
+            </a:r>
+          </a:p>
+          <a:p>
             <a:r>
               <a:rPr lang="en-GB" dirty="0"/>
               <a:t>An inexpensive subscription is required with Twilio</a:t>
@@ -5927,7 +6100,7 @@
             <a:pPr lvl="1"/>
             <a:r>
               <a:rPr lang="en-GB" dirty="0"/>
-              <a:t>Use of this demonstration will require you to build the code for your release of Geo SCADA. (It may be built for ClearSCADA versions, but not take advantage of the new alarm redirection method to user’s phone numbers).</a:t>
+              <a:t>Use of this demonstration will require you to build the code for your release of Geo SCADA. (It may be built for earlier ClearSCADA versions, but not take advantage of the new alarm redirection method to user’s phone numbers).</a:t>
             </a:r>
           </a:p>
           <a:p>

</xml_diff>